<commit_message>
added es6 hands on
</commit_message>
<xml_diff>
--- a/Learning Phase/Week 4/Day 5/JavaScript/Slides/12. Exception Handling/exception-handling-slides.pptx
+++ b/Learning Phase/Week 4/Day 5/JavaScript/Slides/12. Exception Handling/exception-handling-slides.pptx
@@ -5,21 +5,21 @@
     <p:sldMasterId id="2147483648" r:id="rId1"/>
   </p:sldMasterIdLst>
   <p:notesMasterIdLst>
-    <p:notesMasterId r:id="rId15"/>
+    <p:notesMasterId r:id="rId14"/>
   </p:notesMasterIdLst>
   <p:sldIdLst>
-    <p:sldId id="256" r:id="rId3"/>
-    <p:sldId id="257" r:id="rId4"/>
-    <p:sldId id="258" r:id="rId5"/>
-    <p:sldId id="259" r:id="rId6"/>
-    <p:sldId id="260" r:id="rId7"/>
-    <p:sldId id="261" r:id="rId8"/>
-    <p:sldId id="262" r:id="rId9"/>
-    <p:sldId id="263" r:id="rId10"/>
-    <p:sldId id="264" r:id="rId11"/>
-    <p:sldId id="265" r:id="rId12"/>
-    <p:sldId id="271" r:id="rId13"/>
-    <p:sldId id="270" r:id="rId14"/>
+    <p:sldId id="256" r:id="rId2"/>
+    <p:sldId id="257" r:id="rId3"/>
+    <p:sldId id="258" r:id="rId4"/>
+    <p:sldId id="259" r:id="rId5"/>
+    <p:sldId id="260" r:id="rId6"/>
+    <p:sldId id="261" r:id="rId7"/>
+    <p:sldId id="262" r:id="rId8"/>
+    <p:sldId id="263" r:id="rId9"/>
+    <p:sldId id="264" r:id="rId10"/>
+    <p:sldId id="265" r:id="rId11"/>
+    <p:sldId id="271" r:id="rId12"/>
+    <p:sldId id="270" r:id="rId13"/>
   </p:sldIdLst>
   <p:sldSz cx="12192000" cy="6858000"/>
   <p:notesSz cx="12192000" cy="6858000"/>
@@ -216,6 +216,7 @@
           <a:p>
             <a:fld id="{3EFD42F7-718C-4B98-AAEC-167E6DDD60A7}" type="datetimeFigureOut">
               <a:rPr lang="en-US" smtClean="0"/>
+              <a:t>2/14/2024</a:t>
             </a:fld>
             <a:endParaRPr lang="en-US"/>
           </a:p>
@@ -279,42 +280,37 @@
           <a:p>
             <a:pPr lvl="0"/>
             <a:r>
-              <a:rPr lang="en-US" smtClean="0"/>
+              <a:rPr lang="en-US"/>
               <a:t>Click to edit Master text styles</a:t>
             </a:r>
-            <a:endParaRPr lang="en-US" smtClean="0"/>
           </a:p>
           <a:p>
             <a:pPr lvl="1"/>
             <a:r>
-              <a:rPr lang="en-US" smtClean="0"/>
+              <a:rPr lang="en-US"/>
               <a:t>Second level</a:t>
             </a:r>
-            <a:endParaRPr lang="en-US" smtClean="0"/>
           </a:p>
           <a:p>
             <a:pPr lvl="2"/>
             <a:r>
-              <a:rPr lang="en-US" smtClean="0"/>
+              <a:rPr lang="en-US"/>
               <a:t>Third level</a:t>
             </a:r>
-            <a:endParaRPr lang="en-US" smtClean="0"/>
           </a:p>
           <a:p>
             <a:pPr lvl="3"/>
             <a:r>
-              <a:rPr lang="en-US" smtClean="0"/>
+              <a:rPr lang="en-US"/>
               <a:t>Fourth level</a:t>
             </a:r>
-            <a:endParaRPr lang="en-US" smtClean="0"/>
           </a:p>
           <a:p>
             <a:pPr lvl="4"/>
             <a:r>
-              <a:rPr lang="en-US" smtClean="0"/>
+              <a:rPr lang="en-US"/>
               <a:t>Fifth level</a:t>
             </a:r>
-            <a:endParaRPr lang="en-US"/>
           </a:p>
         </p:txBody>
       </p:sp>
@@ -378,6 +374,7 @@
           <a:p>
             <a:fld id="{21B2AA4F-B828-4D7C-AFD3-893933DAFCB4}" type="slidenum">
               <a:rPr lang="en-US" smtClean="0"/>
+              <a:t>‹#›</a:t>
             </a:fld>
             <a:endParaRPr lang="en-US"/>
           </a:p>
@@ -526,7 +523,9 @@
               <a:defRPr/>
             </a:lvl1pPr>
           </a:lstStyle>
-          <a:p/>
+          <a:p>
+            <a:endParaRPr/>
+          </a:p>
         </p:txBody>
       </p:sp>
       <p:sp>
@@ -557,7 +556,9 @@
               <a:defRPr/>
             </a:lvl1pPr>
           </a:lstStyle>
-          <a:p/>
+          <a:p>
+            <a:endParaRPr/>
+          </a:p>
         </p:txBody>
       </p:sp>
       <p:sp>
@@ -584,7 +585,9 @@
               </a:defRPr>
             </a:lvl1pPr>
           </a:lstStyle>
-          <a:p/>
+          <a:p>
+            <a:endParaRPr/>
+          </a:p>
         </p:txBody>
       </p:sp>
       <p:sp>
@@ -614,6 +617,7 @@
           <a:p>
             <a:fld id="{1D8BD707-D9CF-40AE-B4C6-C98DA3205C09}" type="datetimeFigureOut">
               <a:rPr lang="en-US"/>
+              <a:t>2/14/2024</a:t>
             </a:fld>
             <a:endParaRPr lang="en-US"/>
           </a:p>
@@ -646,6 +650,7 @@
           <a:p>
             <a:fld id="{B6F15528-21DE-4FAA-801E-634DDDAF4B2B}" type="slidenum">
               <a:rPr/>
+              <a:t>‹#›</a:t>
             </a:fld>
             <a:endParaRPr/>
           </a:p>
@@ -661,7 +666,7 @@
 </file>
 
 <file path=ppt/slideLayouts/slideLayout2.xml><?xml version="1.0" encoding="utf-8"?>
-<p:sldLayout xmlns:a="http://schemas.openxmlformats.org/drawingml/2006/main" xmlns:r="http://schemas.openxmlformats.org/officeDocument/2006/relationships" xmlns:p="http://schemas.openxmlformats.org/presentationml/2006/main" type="obj" preserve="1" showMasterSp="0">
+<p:sldLayout xmlns:a="http://schemas.openxmlformats.org/drawingml/2006/main" xmlns:r="http://schemas.openxmlformats.org/officeDocument/2006/relationships" xmlns:p="http://schemas.openxmlformats.org/presentationml/2006/main" showMasterSp="0" type="obj" preserve="1">
   <p:cSld name="Title and Content">
     <p:bg>
       <p:bgPr>
@@ -730,7 +735,9 @@
         <p:txBody>
           <a:bodyPr wrap="square" lIns="0" tIns="0" rIns="0" bIns="0" rtlCol="0"/>
           <a:lstStyle/>
-          <a:p/>
+          <a:p>
+            <a:endParaRPr/>
+          </a:p>
         </p:txBody>
       </p:sp>
       <p:sp>
@@ -757,7 +764,9 @@
               </a:defRPr>
             </a:lvl1pPr>
           </a:lstStyle>
-          <a:p/>
+          <a:p>
+            <a:endParaRPr/>
+          </a:p>
         </p:txBody>
       </p:sp>
       <p:sp>
@@ -784,7 +793,9 @@
               </a:defRPr>
             </a:lvl1pPr>
           </a:lstStyle>
-          <a:p/>
+          <a:p>
+            <a:endParaRPr/>
+          </a:p>
         </p:txBody>
       </p:sp>
       <p:sp>
@@ -811,7 +822,9 @@
               </a:defRPr>
             </a:lvl1pPr>
           </a:lstStyle>
-          <a:p/>
+          <a:p>
+            <a:endParaRPr/>
+          </a:p>
         </p:txBody>
       </p:sp>
       <p:sp>
@@ -841,6 +854,7 @@
           <a:p>
             <a:fld id="{1D8BD707-D9CF-40AE-B4C6-C98DA3205C09}" type="datetimeFigureOut">
               <a:rPr lang="en-US"/>
+              <a:t>2/14/2024</a:t>
             </a:fld>
             <a:endParaRPr lang="en-US"/>
           </a:p>
@@ -873,6 +887,7 @@
           <a:p>
             <a:fld id="{B6F15528-21DE-4FAA-801E-634DDDAF4B2B}" type="slidenum">
               <a:rPr/>
+              <a:t>‹#›</a:t>
             </a:fld>
             <a:endParaRPr/>
           </a:p>
@@ -928,7 +943,9 @@
               </a:defRPr>
             </a:lvl1pPr>
           </a:lstStyle>
-          <a:p/>
+          <a:p>
+            <a:endParaRPr/>
+          </a:p>
         </p:txBody>
       </p:sp>
       <p:sp>
@@ -959,7 +976,9 @@
               <a:defRPr/>
             </a:lvl1pPr>
           </a:lstStyle>
-          <a:p/>
+          <a:p>
+            <a:endParaRPr/>
+          </a:p>
         </p:txBody>
       </p:sp>
       <p:sp>
@@ -990,7 +1009,9 @@
               <a:defRPr/>
             </a:lvl1pPr>
           </a:lstStyle>
-          <a:p/>
+          <a:p>
+            <a:endParaRPr/>
+          </a:p>
         </p:txBody>
       </p:sp>
       <p:sp>
@@ -1017,7 +1038,9 @@
               </a:defRPr>
             </a:lvl1pPr>
           </a:lstStyle>
-          <a:p/>
+          <a:p>
+            <a:endParaRPr/>
+          </a:p>
         </p:txBody>
       </p:sp>
       <p:sp>
@@ -1047,6 +1070,7 @@
           <a:p>
             <a:fld id="{1D8BD707-D9CF-40AE-B4C6-C98DA3205C09}" type="datetimeFigureOut">
               <a:rPr lang="en-US"/>
+              <a:t>2/14/2024</a:t>
             </a:fld>
             <a:endParaRPr lang="en-US"/>
           </a:p>
@@ -1079,6 +1103,7 @@
           <a:p>
             <a:fld id="{B6F15528-21DE-4FAA-801E-634DDDAF4B2B}" type="slidenum">
               <a:rPr/>
+              <a:t>‹#›</a:t>
             </a:fld>
             <a:endParaRPr/>
           </a:p>
@@ -1094,7 +1119,7 @@
 </file>
 
 <file path=ppt/slideLayouts/slideLayout4.xml><?xml version="1.0" encoding="utf-8"?>
-<p:sldLayout xmlns:a="http://schemas.openxmlformats.org/drawingml/2006/main" xmlns:r="http://schemas.openxmlformats.org/officeDocument/2006/relationships" xmlns:p="http://schemas.openxmlformats.org/presentationml/2006/main" type="obj" preserve="1" showMasterSp="0">
+<p:sldLayout xmlns:a="http://schemas.openxmlformats.org/drawingml/2006/main" xmlns:r="http://schemas.openxmlformats.org/officeDocument/2006/relationships" xmlns:p="http://schemas.openxmlformats.org/presentationml/2006/main" showMasterSp="0" type="obj" preserve="1">
   <p:cSld name="Title Only">
     <p:bg>
       <p:bgPr>
@@ -1164,7 +1189,9 @@
               </a:defRPr>
             </a:lvl1pPr>
           </a:lstStyle>
-          <a:p/>
+          <a:p>
+            <a:endParaRPr/>
+          </a:p>
         </p:txBody>
       </p:sp>
       <p:sp>
@@ -1191,7 +1218,9 @@
               </a:defRPr>
             </a:lvl1pPr>
           </a:lstStyle>
-          <a:p/>
+          <a:p>
+            <a:endParaRPr/>
+          </a:p>
         </p:txBody>
       </p:sp>
       <p:sp>
@@ -1221,6 +1250,7 @@
           <a:p>
             <a:fld id="{1D8BD707-D9CF-40AE-B4C6-C98DA3205C09}" type="datetimeFigureOut">
               <a:rPr lang="en-US"/>
+              <a:t>2/14/2024</a:t>
             </a:fld>
             <a:endParaRPr lang="en-US"/>
           </a:p>
@@ -1253,6 +1283,7 @@
           <a:p>
             <a:fld id="{B6F15528-21DE-4FAA-801E-634DDDAF4B2B}" type="slidenum">
               <a:rPr/>
+              <a:t>‹#›</a:t>
             </a:fld>
             <a:endParaRPr/>
           </a:p>
@@ -1308,7 +1339,9 @@
               </a:defRPr>
             </a:lvl1pPr>
           </a:lstStyle>
-          <a:p/>
+          <a:p>
+            <a:endParaRPr/>
+          </a:p>
         </p:txBody>
       </p:sp>
       <p:sp>
@@ -1338,6 +1371,7 @@
           <a:p>
             <a:fld id="{1D8BD707-D9CF-40AE-B4C6-C98DA3205C09}" type="datetimeFigureOut">
               <a:rPr lang="en-US"/>
+              <a:t>2/14/2024</a:t>
             </a:fld>
             <a:endParaRPr lang="en-US"/>
           </a:p>
@@ -1370,6 +1404,7 @@
           <a:p>
             <a:fld id="{B6F15528-21DE-4FAA-801E-634DDDAF4B2B}" type="slidenum">
               <a:rPr/>
+              <a:t>‹#›</a:t>
             </a:fld>
             <a:endParaRPr/>
           </a:p>
@@ -1417,10 +1452,9 @@
           <a:lstStyle/>
           <a:p>
             <a:r>
-              <a:rPr lang="en-US" smtClean="0"/>
+              <a:rPr lang="en-US"/>
               <a:t>Click to edit Master title style</a:t>
             </a:r>
-            <a:endParaRPr lang="en-US"/>
           </a:p>
         </p:txBody>
       </p:sp>
@@ -1441,42 +1475,37 @@
           <a:p>
             <a:pPr lvl="0"/>
             <a:r>
-              <a:rPr lang="en-US" smtClean="0"/>
+              <a:rPr lang="en-US"/>
               <a:t>Click to edit Master text styles</a:t>
             </a:r>
-            <a:endParaRPr lang="en-US" smtClean="0"/>
           </a:p>
           <a:p>
             <a:pPr lvl="1"/>
             <a:r>
-              <a:rPr lang="en-US" smtClean="0"/>
+              <a:rPr lang="en-US"/>
               <a:t>Second level</a:t>
             </a:r>
-            <a:endParaRPr lang="en-US" smtClean="0"/>
           </a:p>
           <a:p>
             <a:pPr lvl="2"/>
             <a:r>
-              <a:rPr lang="en-US" smtClean="0"/>
+              <a:rPr lang="en-US"/>
               <a:t>Third level</a:t>
             </a:r>
-            <a:endParaRPr lang="en-US" smtClean="0"/>
           </a:p>
           <a:p>
             <a:pPr lvl="3"/>
             <a:r>
-              <a:rPr lang="en-US" smtClean="0"/>
+              <a:rPr lang="en-US"/>
               <a:t>Fourth level</a:t>
             </a:r>
-            <a:endParaRPr lang="en-US" smtClean="0"/>
           </a:p>
           <a:p>
             <a:pPr lvl="4"/>
             <a:r>
-              <a:rPr lang="en-US" smtClean="0"/>
+              <a:rPr lang="en-US"/>
               <a:t>Fifth level</a:t>
             </a:r>
-            <a:endParaRPr lang="en-US"/>
           </a:p>
         </p:txBody>
       </p:sp>
@@ -1497,6 +1526,7 @@
           <a:p>
             <a:fld id="{1D8BD707-D9CF-40AE-B4C6-C98DA3205C09}" type="datetimeFigureOut">
               <a:rPr lang="en-US"/>
+              <a:t>2/14/2024</a:t>
             </a:fld>
             <a:endParaRPr lang="en-US"/>
           </a:p>
@@ -1516,7 +1546,9 @@
         <p:txBody>
           <a:bodyPr/>
           <a:lstStyle/>
-          <a:p/>
+          <a:p>
+            <a:endParaRPr/>
+          </a:p>
         </p:txBody>
       </p:sp>
       <p:sp>
@@ -1536,6 +1568,7 @@
           <a:p>
             <a:fld id="{B6F15528-21DE-4FAA-801E-634DDDAF4B2B}" type="slidenum">
               <a:rPr/>
+              <a:t>‹#›</a:t>
             </a:fld>
             <a:endParaRPr/>
           </a:p>
@@ -1608,7 +1641,9 @@
               </a:defRPr>
             </a:lvl1pPr>
           </a:lstStyle>
-          <a:p/>
+          <a:p>
+            <a:endParaRPr/>
+          </a:p>
         </p:txBody>
       </p:sp>
       <p:sp>
@@ -1645,7 +1680,9 @@
               </a:defRPr>
             </a:lvl1pPr>
           </a:lstStyle>
-          <a:p/>
+          <a:p>
+            <a:endParaRPr/>
+          </a:p>
         </p:txBody>
       </p:sp>
       <p:sp>
@@ -1682,7 +1719,9 @@
               </a:defRPr>
             </a:lvl1pPr>
           </a:lstStyle>
-          <a:p/>
+          <a:p>
+            <a:endParaRPr/>
+          </a:p>
         </p:txBody>
       </p:sp>
       <p:sp>
@@ -1722,6 +1761,7 @@
           <a:p>
             <a:fld id="{1D8BD707-D9CF-40AE-B4C6-C98DA3205C09}" type="datetimeFigureOut">
               <a:rPr lang="en-US"/>
+              <a:t>2/14/2024</a:t>
             </a:fld>
             <a:endParaRPr lang="en-US"/>
           </a:p>
@@ -1764,6 +1804,7 @@
           <a:p>
             <a:fld id="{B6F15528-21DE-4FAA-801E-634DDDAF4B2B}" type="slidenum">
               <a:rPr/>
+              <a:t>‹#›</a:t>
             </a:fld>
             <a:endParaRPr/>
           </a:p>
@@ -1988,7 +2029,9 @@
           <p:txBody>
             <a:bodyPr wrap="square" lIns="0" tIns="0" rIns="0" bIns="0" rtlCol="0"/>
             <a:lstStyle/>
-            <a:p/>
+            <a:p>
+              <a:endParaRPr/>
+            </a:p>
           </p:txBody>
         </p:sp>
         <p:pic>
@@ -1998,7 +2041,7 @@
             <p:nvPr/>
           </p:nvPicPr>
           <p:blipFill>
-            <a:blip r:embed="rId1" cstate="print"/>
+            <a:blip r:embed="rId2" cstate="print"/>
             <a:stretch>
               <a:fillRect/>
             </a:stretch>
@@ -2136,9 +2179,11 @@
         <p:spPr/>
         <p:txBody>
           <a:bodyPr/>
+          <a:lstStyle/>
           <a:p>
             <a:fld id="{B6F15528-21DE-4FAA-801E-634DDDAF4B2B}" type="slidenum">
               <a:rPr/>
+              <a:t>1</a:t>
             </a:fld>
             <a:endParaRPr/>
           </a:p>
@@ -2228,7 +2273,7 @@
               </a:rPr>
               <a:t>{</a:t>
             </a:r>
-            <a:endParaRPr sz="2400">
+            <a:endParaRPr sz="2400" dirty="0">
               <a:latin typeface="Courier New" panose="02070309020205020404"/>
               <a:cs typeface="Courier New" panose="02070309020205020404"/>
             </a:endParaRPr>
@@ -2292,7 +2337,7 @@
               </a:rPr>
               <a:t>here...</a:t>
             </a:r>
-            <a:endParaRPr sz="2400">
+            <a:endParaRPr sz="2400" dirty="0">
               <a:latin typeface="Courier New" panose="02070309020205020404"/>
               <a:cs typeface="Courier New" panose="02070309020205020404"/>
             </a:endParaRPr>
@@ -2416,7 +2461,7 @@
               </a:rPr>
               <a:t>);</a:t>
             </a:r>
-            <a:endParaRPr sz="2400">
+            <a:endParaRPr sz="2400" dirty="0">
               <a:latin typeface="Courier New" panose="02070309020205020404"/>
               <a:cs typeface="Courier New" panose="02070309020205020404"/>
             </a:endParaRPr>
@@ -2440,7 +2485,7 @@
               </a:rPr>
               <a:t>}</a:t>
             </a:r>
-            <a:endParaRPr sz="2400">
+            <a:endParaRPr sz="2400" dirty="0">
               <a:latin typeface="Courier New" panose="02070309020205020404"/>
               <a:cs typeface="Courier New" panose="02070309020205020404"/>
             </a:endParaRPr>
@@ -2574,7 +2619,7 @@
               </a:rPr>
               <a:t>error);</a:t>
             </a:r>
-            <a:endParaRPr sz="2400">
+            <a:endParaRPr sz="2400" dirty="0">
               <a:latin typeface="Courier New" panose="02070309020205020404"/>
               <a:cs typeface="Courier New" panose="02070309020205020404"/>
             </a:endParaRPr>
@@ -2598,7 +2643,7 @@
               </a:rPr>
               <a:t>}</a:t>
             </a:r>
-            <a:endParaRPr sz="2400">
+            <a:endParaRPr sz="2400" dirty="0">
               <a:latin typeface="Courier New" panose="02070309020205020404"/>
               <a:cs typeface="Courier New" panose="02070309020205020404"/>
             </a:endParaRPr>
@@ -2642,7 +2687,7 @@
               </a:rPr>
               <a:t>{</a:t>
             </a:r>
-            <a:endParaRPr sz="2400">
+            <a:endParaRPr sz="2400" dirty="0">
               <a:latin typeface="Courier New" panose="02070309020205020404"/>
               <a:cs typeface="Courier New" panose="02070309020205020404"/>
             </a:endParaRPr>
@@ -2726,7 +2771,7 @@
               </a:rPr>
               <a:t>);</a:t>
             </a:r>
-            <a:endParaRPr sz="2400">
+            <a:endParaRPr sz="2400" dirty="0">
               <a:latin typeface="Courier New" panose="02070309020205020404"/>
               <a:cs typeface="Courier New" panose="02070309020205020404"/>
             </a:endParaRPr>
@@ -2750,7 +2795,7 @@
               </a:rPr>
               <a:t>}</a:t>
             </a:r>
-            <a:endParaRPr sz="2400">
+            <a:endParaRPr sz="2400" dirty="0">
               <a:latin typeface="Courier New" panose="02070309020205020404"/>
               <a:cs typeface="Courier New" panose="02070309020205020404"/>
             </a:endParaRPr>
@@ -2830,11 +2875,6 @@
               </a:rPr>
               <a:t>w</a:t>
             </a:r>
-            <a:endParaRPr spc="150" dirty="0">
-              <a:solidFill>
-                <a:srgbClr val="404040"/>
-              </a:solidFill>
-            </a:endParaRPr>
           </a:p>
         </p:txBody>
       </p:sp>
@@ -2851,9 +2891,11 @@
         <p:spPr/>
         <p:txBody>
           <a:bodyPr/>
+          <a:lstStyle/>
           <a:p>
             <a:fld id="{B6F15528-21DE-4FAA-801E-634DDDAF4B2B}" type="slidenum">
               <a:rPr/>
+              <a:t>10</a:t>
             </a:fld>
             <a:endParaRPr/>
           </a:p>
@@ -2876,7 +2918,14 @@
         <p:cNvGrpSpPr/>
         <p:nvPr/>
       </p:nvGrpSpPr>
-      <p:grpSpPr/>
+      <p:grpSpPr>
+        <a:xfrm>
+          <a:off x="0" y="0"/>
+          <a:ext cx="0" cy="0"/>
+          <a:chOff x="0" y="0"/>
+          <a:chExt cx="0" cy="0"/>
+        </a:xfrm>
+      </p:grpSpPr>
       <p:sp>
         <p:nvSpPr>
           <p:cNvPr id="4" name="Slide Number Placeholder 3"/>
@@ -2895,9 +2944,11 @@
         </p:spPr>
         <p:txBody>
           <a:bodyPr/>
+          <a:lstStyle/>
           <a:p>
             <a:fld id="{B6F15528-21DE-4FAA-801E-634DDDAF4B2B}" type="slidenum">
               <a:rPr/>
+              <a:t>11</a:t>
             </a:fld>
             <a:endParaRPr/>
           </a:p>
@@ -2912,7 +2963,7 @@
           <p:nvPr/>
         </p:nvPicPr>
         <p:blipFill>
-          <a:blip r:embed="rId1"/>
+          <a:blip r:embed="rId2"/>
           <a:stretch>
             <a:fillRect/>
           </a:stretch>
@@ -2947,6 +2998,7 @@
           <a:bodyPr wrap="square" rtlCol="0">
             <a:spAutoFit/>
           </a:bodyPr>
+          <a:lstStyle/>
           <a:p>
             <a:r>
               <a:rPr lang="en-US" b="1"/>
@@ -2958,7 +3010,7 @@
             </a:r>
             <a:r>
               <a:rPr lang="en-US">
-                <a:hlinkClick r:id="rId2" tooltip=""/>
+                <a:hlinkClick r:id="rId3"/>
               </a:rPr>
               <a:t>http://help.dottoro.com/ljfhismo.php</a:t>
             </a:r>
@@ -2998,7 +3050,7 @@
           <p:nvPr/>
         </p:nvPicPr>
         <p:blipFill>
-          <a:blip r:embed="rId1" cstate="print"/>
+          <a:blip r:embed="rId2" cstate="print"/>
           <a:stretch>
             <a:fillRect/>
           </a:stretch>
@@ -3156,7 +3208,7 @@
               </a:rPr>
               <a:t>execution?</a:t>
             </a:r>
-            <a:endParaRPr sz="2400">
+            <a:endParaRPr sz="2400" dirty="0">
               <a:latin typeface="Verdana" panose="020B0604030504040204"/>
               <a:cs typeface="Verdana" panose="020B0604030504040204"/>
             </a:endParaRPr>
@@ -3280,7 +3332,7 @@
               </a:rPr>
               <a:t>catch</a:t>
             </a:r>
-            <a:endParaRPr sz="2400">
+            <a:endParaRPr sz="2400" dirty="0">
               <a:latin typeface="Verdana" panose="020B0604030504040204"/>
               <a:cs typeface="Verdana" panose="020B0604030504040204"/>
             </a:endParaRPr>
@@ -3391,7 +3443,7 @@
               </a:rPr>
               <a:t>exception</a:t>
             </a:r>
-            <a:endParaRPr sz="2400">
+            <a:endParaRPr sz="2400" dirty="0">
               <a:latin typeface="Verdana" panose="020B0604030504040204"/>
               <a:cs typeface="Verdana" panose="020B0604030504040204"/>
             </a:endParaRPr>
@@ -3415,7 +3467,7 @@
               </a:rPr>
               <a:t>finally</a:t>
             </a:r>
-            <a:endParaRPr sz="2400">
+            <a:endParaRPr sz="2400" dirty="0">
               <a:latin typeface="Verdana" panose="020B0604030504040204"/>
               <a:cs typeface="Verdana" panose="020B0604030504040204"/>
             </a:endParaRPr>
@@ -3466,7 +3518,7 @@
               </a:rPr>
               <a:t>executes</a:t>
             </a:r>
-            <a:endParaRPr sz="2400">
+            <a:endParaRPr sz="2400" dirty="0">
               <a:latin typeface="Verdana" panose="020B0604030504040204"/>
               <a:cs typeface="Verdana" panose="020B0604030504040204"/>
             </a:endParaRPr>
@@ -3530,7 +3582,7 @@
               </a:rPr>
               <a:t>Errors</a:t>
             </a:r>
-            <a:endParaRPr sz="2400">
+            <a:endParaRPr sz="2400" dirty="0">
               <a:latin typeface="Verdana" panose="020B0604030504040204"/>
               <a:cs typeface="Verdana" panose="020B0604030504040204"/>
             </a:endParaRPr>
@@ -3561,7 +3613,7 @@
               </a:rPr>
               <a:t>throw</a:t>
             </a:r>
-            <a:endParaRPr sz="2400">
+            <a:endParaRPr sz="2400" dirty="0">
               <a:latin typeface="Verdana" panose="020B0604030504040204"/>
               <a:cs typeface="Verdana" panose="020B0604030504040204"/>
             </a:endParaRPr>
@@ -3588,13 +3640,6 @@
               </a:rPr>
               <a:t>Error Object</a:t>
             </a:r>
-            <a:endParaRPr sz="2400" spc="-130" dirty="0">
-              <a:solidFill>
-                <a:srgbClr val="F05A28"/>
-              </a:solidFill>
-              <a:latin typeface="Verdana" panose="020B0604030504040204"/>
-              <a:cs typeface="Verdana" panose="020B0604030504040204"/>
-            </a:endParaRPr>
           </a:p>
           <a:p>
             <a:pPr marL="541655" indent="-289560" algn="l">
@@ -3623,13 +3668,6 @@
               </a:rPr>
               <a:t>Properties</a:t>
             </a:r>
-            <a:endParaRPr sz="2400" dirty="0">
-              <a:solidFill>
-                <a:srgbClr val="F05A28"/>
-              </a:solidFill>
-              <a:latin typeface="Verdana" panose="020B0604030504040204"/>
-              <a:cs typeface="Verdana" panose="020B0604030504040204"/>
-            </a:endParaRPr>
           </a:p>
           <a:p>
             <a:pPr marL="541655" indent="-289560" algn="l">
@@ -3658,13 +3696,6 @@
               </a:rPr>
               <a:t>Methods</a:t>
             </a:r>
-            <a:endParaRPr sz="2400" dirty="0">
-              <a:solidFill>
-                <a:srgbClr val="F05A28"/>
-              </a:solidFill>
-              <a:latin typeface="Verdana" panose="020B0604030504040204"/>
-              <a:cs typeface="Verdana" panose="020B0604030504040204"/>
-            </a:endParaRPr>
           </a:p>
         </p:txBody>
       </p:sp>
@@ -3727,9 +3758,11 @@
         <p:spPr/>
         <p:txBody>
           <a:bodyPr/>
+          <a:lstStyle/>
           <a:p>
             <a:fld id="{B6F15528-21DE-4FAA-801E-634DDDAF4B2B}" type="slidenum">
               <a:rPr/>
+              <a:t>12</a:t>
             </a:fld>
             <a:endParaRPr/>
           </a:p>
@@ -3767,7 +3800,7 @@
           <p:nvPr/>
         </p:nvPicPr>
         <p:blipFill>
-          <a:blip r:embed="rId1" cstate="print"/>
+          <a:blip r:embed="rId2" cstate="print"/>
           <a:stretch>
             <a:fillRect/>
           </a:stretch>
@@ -4159,9 +4192,11 @@
         <p:spPr/>
         <p:txBody>
           <a:bodyPr/>
+          <a:lstStyle/>
           <a:p>
             <a:fld id="{B6F15528-21DE-4FAA-801E-634DDDAF4B2B}" type="slidenum">
               <a:rPr/>
+              <a:t>2</a:t>
             </a:fld>
             <a:endParaRPr/>
           </a:p>
@@ -4245,7 +4280,6 @@
               <a:rPr spc="5" dirty="0"/>
               <a:t>JavaScript</a:t>
             </a:r>
-            <a:endParaRPr spc="5" dirty="0"/>
           </a:p>
         </p:txBody>
       </p:sp>
@@ -4262,9 +4296,11 @@
         <p:spPr/>
         <p:txBody>
           <a:bodyPr/>
+          <a:lstStyle/>
           <a:p>
             <a:fld id="{B6F15528-21DE-4FAA-801E-634DDDAF4B2B}" type="slidenum">
               <a:rPr/>
+              <a:t>3</a:t>
             </a:fld>
             <a:endParaRPr/>
           </a:p>
@@ -4394,7 +4430,7 @@
               </a:rPr>
               <a:t>newCar;</a:t>
             </a:r>
-            <a:endParaRPr sz="2400">
+            <a:endParaRPr sz="2400" dirty="0">
               <a:latin typeface="Courier New" panose="02070309020205020404"/>
               <a:cs typeface="Courier New" panose="02070309020205020404"/>
             </a:endParaRPr>
@@ -4408,7 +4444,7 @@
                 <a:spcPts val="35"/>
               </a:spcBef>
             </a:pPr>
-            <a:endParaRPr sz="4100">
+            <a:endParaRPr sz="4100" dirty="0">
               <a:latin typeface="Courier New" panose="02070309020205020404"/>
               <a:cs typeface="Courier New" panose="02070309020205020404"/>
             </a:endParaRPr>
@@ -4449,7 +4485,7 @@
               </a:rPr>
               <a:t>);</a:t>
             </a:r>
-            <a:endParaRPr sz="2400">
+            <a:endParaRPr sz="2400" dirty="0">
               <a:latin typeface="Courier New" panose="02070309020205020404"/>
               <a:cs typeface="Courier New" panose="02070309020205020404"/>
             </a:endParaRPr>
@@ -4529,11 +4565,6 @@
               </a:rPr>
               <a:t>JavaScript</a:t>
             </a:r>
-            <a:endParaRPr spc="-10" dirty="0">
-              <a:solidFill>
-                <a:srgbClr val="404040"/>
-              </a:solidFill>
-            </a:endParaRPr>
           </a:p>
         </p:txBody>
       </p:sp>
@@ -4550,9 +4581,11 @@
         <p:spPr/>
         <p:txBody>
           <a:bodyPr/>
+          <a:lstStyle/>
           <a:p>
             <a:fld id="{B6F15528-21DE-4FAA-801E-634DDDAF4B2B}" type="slidenum">
               <a:rPr/>
+              <a:t>4</a:t>
             </a:fld>
             <a:endParaRPr/>
           </a:p>
@@ -4660,7 +4693,6 @@
               <a:rPr spc="30" dirty="0"/>
               <a:t>catch</a:t>
             </a:r>
-            <a:endParaRPr spc="30" dirty="0"/>
           </a:p>
         </p:txBody>
       </p:sp>
@@ -4677,9 +4709,11 @@
         <p:spPr/>
         <p:txBody>
           <a:bodyPr/>
+          <a:lstStyle/>
           <a:p>
             <a:fld id="{B6F15528-21DE-4FAA-801E-634DDDAF4B2B}" type="slidenum">
               <a:rPr/>
+              <a:t>5</a:t>
             </a:fld>
             <a:endParaRPr/>
           </a:p>
@@ -4769,7 +4803,7 @@
               </a:rPr>
               <a:t>{</a:t>
             </a:r>
-            <a:endParaRPr sz="2400">
+            <a:endParaRPr sz="2400" dirty="0">
               <a:latin typeface="Courier New" panose="02070309020205020404"/>
               <a:cs typeface="Courier New" panose="02070309020205020404"/>
             </a:endParaRPr>
@@ -4853,7 +4887,7 @@
               </a:rPr>
               <a:t>newCar;</a:t>
             </a:r>
-            <a:endParaRPr sz="2400">
+            <a:endParaRPr sz="2400" dirty="0">
               <a:latin typeface="Courier New" panose="02070309020205020404"/>
               <a:cs typeface="Courier New" panose="02070309020205020404"/>
             </a:endParaRPr>
@@ -4877,7 +4911,7 @@
               </a:rPr>
               <a:t>}</a:t>
             </a:r>
-            <a:endParaRPr sz="2400">
+            <a:endParaRPr sz="2400" dirty="0">
               <a:latin typeface="Courier New" panose="02070309020205020404"/>
               <a:cs typeface="Courier New" panose="02070309020205020404"/>
             </a:endParaRPr>
@@ -5011,7 +5045,7 @@
               </a:rPr>
               <a:t>error);</a:t>
             </a:r>
-            <a:endParaRPr sz="2400">
+            <a:endParaRPr sz="2400" dirty="0">
               <a:latin typeface="Courier New" panose="02070309020205020404"/>
               <a:cs typeface="Courier New" panose="02070309020205020404"/>
             </a:endParaRPr>
@@ -5035,7 +5069,7 @@
               </a:rPr>
               <a:t>}</a:t>
             </a:r>
-            <a:endParaRPr sz="2400">
+            <a:endParaRPr sz="2400" dirty="0">
               <a:latin typeface="Courier New" panose="02070309020205020404"/>
               <a:cs typeface="Courier New" panose="02070309020205020404"/>
             </a:endParaRPr>
@@ -5079,7 +5113,7 @@
               </a:rPr>
               <a:t>);</a:t>
             </a:r>
-            <a:endParaRPr sz="2400">
+            <a:endParaRPr sz="2400" dirty="0">
               <a:latin typeface="Courier New" panose="02070309020205020404"/>
               <a:cs typeface="Courier New" panose="02070309020205020404"/>
             </a:endParaRPr>
@@ -5159,11 +5193,6 @@
               </a:rPr>
               <a:t>catch</a:t>
             </a:r>
-            <a:endParaRPr spc="20" dirty="0">
-              <a:solidFill>
-                <a:srgbClr val="404040"/>
-              </a:solidFill>
-            </a:endParaRPr>
           </a:p>
         </p:txBody>
       </p:sp>
@@ -5180,9 +5209,11 @@
         <p:spPr/>
         <p:txBody>
           <a:bodyPr/>
+          <a:lstStyle/>
           <a:p>
             <a:fld id="{B6F15528-21DE-4FAA-801E-634DDDAF4B2B}" type="slidenum">
               <a:rPr/>
+              <a:t>6</a:t>
             </a:fld>
             <a:endParaRPr/>
           </a:p>
@@ -5250,7 +5281,6 @@
               <a:rPr spc="-35" dirty="0"/>
               <a:t>finally</a:t>
             </a:r>
-            <a:endParaRPr spc="-35" dirty="0"/>
           </a:p>
         </p:txBody>
       </p:sp>
@@ -5267,9 +5297,11 @@
         <p:spPr/>
         <p:txBody>
           <a:bodyPr/>
+          <a:lstStyle/>
           <a:p>
             <a:fld id="{B6F15528-21DE-4FAA-801E-634DDDAF4B2B}" type="slidenum">
               <a:rPr/>
+              <a:t>7</a:t>
             </a:fld>
             <a:endParaRPr/>
           </a:p>
@@ -5308,7 +5340,7 @@
         </p:nvSpPr>
         <p:spPr>
           <a:xfrm>
-            <a:off x="688635" y="1529588"/>
+            <a:off x="725463" y="1600200"/>
             <a:ext cx="7184390" cy="4536440"/>
           </a:xfrm>
           <a:prstGeom prst="rect">
@@ -5359,7 +5391,7 @@
               </a:rPr>
               <a:t>{</a:t>
             </a:r>
-            <a:endParaRPr sz="2400">
+            <a:endParaRPr sz="2400" dirty="0">
               <a:latin typeface="Courier New" panose="02070309020205020404"/>
               <a:cs typeface="Courier New" panose="02070309020205020404"/>
             </a:endParaRPr>
@@ -5443,7 +5475,7 @@
               </a:rPr>
               <a:t>newCar;</a:t>
             </a:r>
-            <a:endParaRPr sz="2400">
+            <a:endParaRPr sz="2400" dirty="0">
               <a:latin typeface="Courier New" panose="02070309020205020404"/>
               <a:cs typeface="Courier New" panose="02070309020205020404"/>
             </a:endParaRPr>
@@ -5467,7 +5499,7 @@
               </a:rPr>
               <a:t>}</a:t>
             </a:r>
-            <a:endParaRPr sz="2400">
+            <a:endParaRPr sz="2400" dirty="0">
               <a:latin typeface="Courier New" panose="02070309020205020404"/>
               <a:cs typeface="Courier New" panose="02070309020205020404"/>
             </a:endParaRPr>
@@ -5601,7 +5633,7 @@
               </a:rPr>
               <a:t>error);</a:t>
             </a:r>
-            <a:endParaRPr sz="2400">
+            <a:endParaRPr sz="2400" dirty="0">
               <a:latin typeface="Courier New" panose="02070309020205020404"/>
               <a:cs typeface="Courier New" panose="02070309020205020404"/>
             </a:endParaRPr>
@@ -5625,7 +5657,7 @@
               </a:rPr>
               <a:t>}</a:t>
             </a:r>
-            <a:endParaRPr sz="2400">
+            <a:endParaRPr sz="2400" dirty="0">
               <a:latin typeface="Courier New" panose="02070309020205020404"/>
               <a:cs typeface="Courier New" panose="02070309020205020404"/>
             </a:endParaRPr>
@@ -5669,7 +5701,7 @@
               </a:rPr>
               <a:t>{</a:t>
             </a:r>
-            <a:endParaRPr sz="2400">
+            <a:endParaRPr sz="2400" dirty="0">
               <a:latin typeface="Courier New" panose="02070309020205020404"/>
               <a:cs typeface="Courier New" panose="02070309020205020404"/>
             </a:endParaRPr>
@@ -5753,7 +5785,7 @@
               </a:rPr>
               <a:t>);</a:t>
             </a:r>
-            <a:endParaRPr sz="2400">
+            <a:endParaRPr sz="2400" dirty="0">
               <a:latin typeface="Courier New" panose="02070309020205020404"/>
               <a:cs typeface="Courier New" panose="02070309020205020404"/>
             </a:endParaRPr>
@@ -5777,7 +5809,7 @@
               </a:rPr>
               <a:t>}</a:t>
             </a:r>
-            <a:endParaRPr sz="2400">
+            <a:endParaRPr sz="2400" dirty="0">
               <a:latin typeface="Courier New" panose="02070309020205020404"/>
               <a:cs typeface="Courier New" panose="02070309020205020404"/>
             </a:endParaRPr>
@@ -5867,13 +5899,6 @@
               </a:rPr>
               <a:t>finally</a:t>
             </a:r>
-            <a:endParaRPr spc="150" dirty="0">
-              <a:solidFill>
-                <a:srgbClr val="404040"/>
-              </a:solidFill>
-              <a:latin typeface="Tahoma" panose="020B0604030504040204"/>
-              <a:cs typeface="Tahoma" panose="020B0604030504040204"/>
-            </a:endParaRPr>
           </a:p>
         </p:txBody>
       </p:sp>
@@ -5890,9 +5915,11 @@
         <p:spPr/>
         <p:txBody>
           <a:bodyPr/>
+          <a:lstStyle/>
           <a:p>
             <a:fld id="{B6F15528-21DE-4FAA-801E-634DDDAF4B2B}" type="slidenum">
               <a:rPr/>
+              <a:t>8</a:t>
             </a:fld>
             <a:endParaRPr/>
           </a:p>
@@ -5976,7 +6003,6 @@
               <a:rPr spc="-20" dirty="0"/>
               <a:t>Errors</a:t>
             </a:r>
-            <a:endParaRPr spc="-20" dirty="0"/>
           </a:p>
         </p:txBody>
       </p:sp>
@@ -5993,9 +6019,11 @@
         <p:spPr/>
         <p:txBody>
           <a:bodyPr/>
+          <a:lstStyle/>
           <a:p>
             <a:fld id="{B6F15528-21DE-4FAA-801E-634DDDAF4B2B}" type="slidenum">
               <a:rPr/>
+              <a:t>9</a:t>
             </a:fld>
             <a:endParaRPr/>
           </a:p>
@@ -6287,6 +6315,8 @@
       </a:bgFillStyleLst>
     </a:fmtScheme>
   </a:themeElements>
+  <a:objectDefaults/>
+  <a:extraClrSchemeLst/>
   <a:extLst>
     <a:ext uri="{05A4C25C-085E-4340-85A3-A5531E510DB2}">
       <thm15:themeFamily xmlns:thm15="http://schemas.microsoft.com/office/thememl/2012/main" name="Office Theme" id="{62F939B6-93AF-4DB8-9C6B-D6C7DFDC589F}" vid="{4A3C46E8-61CC-4603-A589-7422A47A8E4A}"/>
@@ -6546,6 +6576,8 @@
       </a:bgFillStyleLst>
     </a:fmtScheme>
   </a:themeElements>
+  <a:objectDefaults/>
+  <a:extraClrSchemeLst/>
   <a:extLst>
     <a:ext uri="{05A4C25C-085E-4340-85A3-A5531E510DB2}">
       <thm15:themeFamily xmlns:thm15="http://schemas.microsoft.com/office/thememl/2012/main" name="Office Theme" id="{62F939B6-93AF-4DB8-9C6B-D6C7DFDC589F}" vid="{4A3C46E8-61CC-4603-A589-7422A47A8E4A}"/>

</xml_diff>